<commit_message>
conclusão do último slide e pequenas correções observadas durante a aula
</commit_message>
<xml_diff>
--- a/plataformas.pptx
+++ b/plataformas.pptx
@@ -206,7 +206,7 @@
           <a:p>
             <a:fld id="{94D3EB41-CF60-4C9F-BD83-AE56FA0945EB}" type="datetimeFigureOut">
               <a:rPr lang="pt-BR" smtClean="0"/>
-              <a:t>20/05/2019</a:t>
+              <a:t>21/05/2019</a:t>
             </a:fld>
             <a:endParaRPr lang="pt-BR"/>
           </a:p>
@@ -716,7 +716,7 @@
           <a:p>
             <a:fld id="{9642BF85-54FF-46CE-B398-87F998CFD60B}" type="datetimeFigureOut">
               <a:rPr lang="pt-BR" smtClean="0"/>
-              <a:t>20/05/2019</a:t>
+              <a:t>21/05/2019</a:t>
             </a:fld>
             <a:endParaRPr lang="pt-BR"/>
           </a:p>
@@ -884,7 +884,7 @@
           <a:p>
             <a:fld id="{9642BF85-54FF-46CE-B398-87F998CFD60B}" type="datetimeFigureOut">
               <a:rPr lang="pt-BR" smtClean="0"/>
-              <a:t>20/05/2019</a:t>
+              <a:t>21/05/2019</a:t>
             </a:fld>
             <a:endParaRPr lang="pt-BR"/>
           </a:p>
@@ -1062,7 +1062,7 @@
           <a:p>
             <a:fld id="{9642BF85-54FF-46CE-B398-87F998CFD60B}" type="datetimeFigureOut">
               <a:rPr lang="pt-BR" smtClean="0"/>
-              <a:t>20/05/2019</a:t>
+              <a:t>21/05/2019</a:t>
             </a:fld>
             <a:endParaRPr lang="pt-BR"/>
           </a:p>
@@ -1399,7 +1399,7 @@
           <a:p>
             <a:fld id="{9642BF85-54FF-46CE-B398-87F998CFD60B}" type="datetimeFigureOut">
               <a:rPr lang="pt-BR" smtClean="0"/>
-              <a:t>20/05/2019</a:t>
+              <a:t>21/05/2019</a:t>
             </a:fld>
             <a:endParaRPr lang="pt-BR"/>
           </a:p>
@@ -1670,7 +1670,7 @@
           <a:p>
             <a:fld id="{9642BF85-54FF-46CE-B398-87F998CFD60B}" type="datetimeFigureOut">
               <a:rPr lang="pt-BR" smtClean="0"/>
-              <a:t>20/05/2019</a:t>
+              <a:t>21/05/2019</a:t>
             </a:fld>
             <a:endParaRPr lang="pt-BR"/>
           </a:p>
@@ -1916,7 +1916,7 @@
           <a:p>
             <a:fld id="{9642BF85-54FF-46CE-B398-87F998CFD60B}" type="datetimeFigureOut">
               <a:rPr lang="pt-BR" smtClean="0"/>
-              <a:t>20/05/2019</a:t>
+              <a:t>21/05/2019</a:t>
             </a:fld>
             <a:endParaRPr lang="pt-BR"/>
           </a:p>
@@ -2280,7 +2280,7 @@
           <a:p>
             <a:fld id="{9642BF85-54FF-46CE-B398-87F998CFD60B}" type="datetimeFigureOut">
               <a:rPr lang="pt-BR" smtClean="0"/>
-              <a:t>20/05/2019</a:t>
+              <a:t>21/05/2019</a:t>
             </a:fld>
             <a:endParaRPr lang="pt-BR"/>
           </a:p>
@@ -2414,7 +2414,7 @@
           <a:p>
             <a:fld id="{9642BF85-54FF-46CE-B398-87F998CFD60B}" type="datetimeFigureOut">
               <a:rPr lang="pt-BR" smtClean="0"/>
-              <a:t>20/05/2019</a:t>
+              <a:t>21/05/2019</a:t>
             </a:fld>
             <a:endParaRPr lang="pt-BR"/>
           </a:p>
@@ -2509,7 +2509,7 @@
           <a:p>
             <a:fld id="{9642BF85-54FF-46CE-B398-87F998CFD60B}" type="datetimeFigureOut">
               <a:rPr lang="pt-BR" smtClean="0"/>
-              <a:t>20/05/2019</a:t>
+              <a:t>21/05/2019</a:t>
             </a:fld>
             <a:endParaRPr lang="pt-BR"/>
           </a:p>
@@ -2784,7 +2784,7 @@
           <a:p>
             <a:fld id="{9642BF85-54FF-46CE-B398-87F998CFD60B}" type="datetimeFigureOut">
               <a:rPr lang="pt-BR" smtClean="0"/>
-              <a:t>20/05/2019</a:t>
+              <a:t>21/05/2019</a:t>
             </a:fld>
             <a:endParaRPr lang="pt-BR"/>
           </a:p>
@@ -3036,7 +3036,7 @@
           <a:p>
             <a:fld id="{9642BF85-54FF-46CE-B398-87F998CFD60B}" type="datetimeFigureOut">
               <a:rPr lang="pt-BR" smtClean="0"/>
-              <a:t>20/05/2019</a:t>
+              <a:t>21/05/2019</a:t>
             </a:fld>
             <a:endParaRPr lang="pt-BR"/>
           </a:p>
@@ -3256,7 +3256,7 @@
           <a:p>
             <a:fld id="{9642BF85-54FF-46CE-B398-87F998CFD60B}" type="datetimeFigureOut">
               <a:rPr lang="pt-BR" smtClean="0"/>
-              <a:t>20/05/2019</a:t>
+              <a:t>21/05/2019</a:t>
             </a:fld>
             <a:endParaRPr lang="pt-BR"/>
           </a:p>
@@ -3808,27 +3808,49 @@
           <a:p>
             <a:pPr marL="514350" indent="-514350" algn="l">
               <a:buFont typeface="+mj-lt"/>
-              <a:buAutoNum type="arabicPeriod" startAt="3"/>
+              <a:buAutoNum type="arabicPeriod" startAt="4"/>
             </a:pPr>
             <a:r>
-              <a:rPr lang="pt-BR">
+              <a:rPr lang="pt-BR" dirty="0" err="1" smtClean="0"/>
+              <a:t>Ottoboni</a:t>
+            </a:r>
+            <a:r>
+              <a:rPr lang="pt-BR" dirty="0" smtClean="0"/>
+              <a:t>, </a:t>
+            </a:r>
+            <a:r>
+              <a:rPr lang="pt-BR" dirty="0"/>
+              <a:t>F. Programando threads em C</a:t>
+            </a:r>
+            <a:r>
+              <a:rPr lang="pt-BR" dirty="0" smtClean="0"/>
+              <a:t>#. Disponível em: </a:t>
+            </a:r>
+            <a:r>
+              <a:rPr lang="pt-BR" dirty="0" smtClean="0">
                 <a:hlinkClick r:id="rId2"/>
               </a:rPr>
-              <a:t>https://imasters.com.br/back-end/programando-threads-em-c</a:t>
+              <a:t>https</a:t>
+            </a:r>
+            <a:r>
+              <a:rPr lang="pt-BR" dirty="0">
+                <a:hlinkClick r:id="rId2"/>
+              </a:rPr>
+              <a:t>://imasters.com.br/back-end/programando-threads-em-c</a:t>
             </a:r>
             <a:endParaRPr lang="pt-BR" dirty="0" smtClean="0"/>
           </a:p>
           <a:p>
             <a:pPr marL="514350" indent="-514350" algn="l">
               <a:buFont typeface="+mj-lt"/>
-              <a:buAutoNum type="arabicPeriod" startAt="3"/>
+              <a:buAutoNum type="arabicPeriod" startAt="4"/>
             </a:pPr>
             <a:endParaRPr lang="pt-BR" dirty="0" smtClean="0"/>
           </a:p>
           <a:p>
             <a:pPr marL="514350" indent="-514350" algn="l">
               <a:buFont typeface="+mj-lt"/>
-              <a:buAutoNum type="arabicPeriod" startAt="3"/>
+              <a:buAutoNum type="arabicPeriod" startAt="4"/>
             </a:pPr>
             <a:endParaRPr lang="pt-BR" dirty="0"/>
           </a:p>
@@ -4008,36 +4030,36 @@
           <a:p>
             <a:r>
               <a:rPr lang="pt-BR" dirty="0">
-                <a:hlinkClick r:id="rId2" action="ppaction://hlinkfile"/>
+                <a:hlinkClick r:id="rId2"/>
               </a:rPr>
               <a:t>Revista </a:t>
             </a:r>
             <a:r>
               <a:rPr lang="pt-BR" dirty="0" smtClean="0">
-                <a:hlinkClick r:id="rId2" action="ppaction://hlinkfile"/>
+                <a:hlinkClick r:id="rId2"/>
               </a:rPr>
               <a:t>EXAME:</a:t>
             </a:r>
             <a:br>
               <a:rPr lang="pt-BR" dirty="0" smtClean="0">
-                <a:hlinkClick r:id="rId2" action="ppaction://hlinkfile"/>
+                <a:hlinkClick r:id="rId2"/>
               </a:rPr>
             </a:br>
             <a:r>
               <a:rPr lang="pt-BR" dirty="0" smtClean="0">
-                <a:hlinkClick r:id="rId2" action="ppaction://hlinkfile"/>
+                <a:hlinkClick r:id="rId2"/>
               </a:rPr>
               <a:t>Estas </a:t>
             </a:r>
             <a:r>
               <a:rPr lang="pt-BR" dirty="0">
-                <a:hlinkClick r:id="rId2" action="ppaction://hlinkfile"/>
+                <a:hlinkClick r:id="rId2"/>
               </a:rPr>
               <a:t>são as 20 linguagens de programação mais </a:t>
             </a:r>
             <a:r>
               <a:rPr lang="pt-BR" dirty="0" smtClean="0">
-                <a:hlinkClick r:id="rId2" action="ppaction://hlinkfile"/>
+                <a:hlinkClick r:id="rId2"/>
               </a:rPr>
               <a:t>usadas</a:t>
             </a:r>
@@ -4182,7 +4204,11 @@
             </a:r>
             <a:r>
               <a:rPr lang="pt-BR" dirty="0"/>
-              <a:t>pode usar C# para criar aplicativos de cliente do Windows, serviços Web XML, componentes distribuídos, aplicativos cliente-servidor, aplicativos de banco de dados e muito, muito mais</a:t>
+              <a:t>pode usar C# para criar aplicativos de cliente do Windows, serviços Web XML, componentes distribuídos, aplicativos cliente-servidor, aplicativos de banco de dados e </a:t>
+            </a:r>
+            <a:r>
+              <a:rPr lang="pt-BR" dirty="0" smtClean="0"/>
+              <a:t>muito mais</a:t>
             </a:r>
             <a:r>
               <a:rPr lang="pt-BR" dirty="0" smtClean="0"/>
@@ -4381,7 +4407,6 @@
               <a:rPr lang="pt-BR" dirty="0"/>
               <a:t>Cargas de trabalho do Visual Studio</a:t>
             </a:r>
-            <a:endParaRPr lang="pt-BR" dirty="0"/>
           </a:p>
         </p:txBody>
       </p:sp>
@@ -4501,7 +4526,49 @@
           </a:bodyPr>
           <a:lstStyle/>
           <a:p>
-            <a:endParaRPr lang="pt-BR" u="sng" dirty="0"/>
+            <a:r>
+              <a:rPr lang="pt-BR" dirty="0" smtClean="0"/>
+              <a:t>Todo </a:t>
+            </a:r>
+            <a:r>
+              <a:rPr lang="pt-BR" dirty="0"/>
+              <a:t>programa </a:t>
+            </a:r>
+            <a:r>
+              <a:rPr lang="pt-BR" dirty="0" smtClean="0"/>
+              <a:t>possui </a:t>
+            </a:r>
+            <a:r>
+              <a:rPr lang="pt-BR" dirty="0"/>
+              <a:t>uma </a:t>
+            </a:r>
+            <a:r>
+              <a:rPr lang="pt-BR" dirty="0" smtClean="0"/>
+              <a:t>thread </a:t>
+            </a:r>
+            <a:r>
+              <a:rPr lang="pt-BR" dirty="0"/>
+              <a:t>principal. Muitos programas geralmente precisam realizar tarefas que levam um longo tempo. Se a thread principal do aplicativo for dedicada a isto, o aplicativo pode parar de responder </a:t>
+            </a:r>
+            <a:r>
+              <a:rPr lang="pt-BR" dirty="0" smtClean="0"/>
+              <a:t>por um tempo.</a:t>
+            </a:r>
+            <a:endParaRPr lang="pt-BR" dirty="0"/>
+          </a:p>
+          <a:p>
+            <a:r>
+              <a:rPr lang="pt-BR" dirty="0"/>
+              <a:t>Para permitir que um aplicativo execute uma tarefa e continue a responder, ou para realizar várias tarefas ao mesmo tempo, podemos programar conceitos de multitarefa (</a:t>
+            </a:r>
+            <a:r>
+              <a:rPr lang="pt-BR" dirty="0" err="1"/>
+              <a:t>multithreading</a:t>
+            </a:r>
+            <a:r>
+              <a:rPr lang="pt-BR" dirty="0"/>
+              <a:t>).</a:t>
+            </a:r>
           </a:p>
         </p:txBody>
       </p:sp>

</xml_diff>